<commit_message>
DEBUG: small file edits to try out XODR imports into Roadrunner
</commit_message>
<xml_diff>
--- a/Documents/xodr_differences.pptx
+++ b/Documents/xodr_differences.pptx
@@ -278,7 +278,7 @@
           <a:p>
             <a:fld id="{7DF28905-4B95-6844-8CDC-50CBDDC02332}" type="datetimeFigureOut">
               <a:rPr lang="en-US" smtClean="0"/>
-              <a:t>8/5/22</a:t>
+              <a:t>8/5/2022</a:t>
             </a:fld>
             <a:endParaRPr lang="en-US"/>
           </a:p>
@@ -476,7 +476,7 @@
           <a:p>
             <a:fld id="{7DF28905-4B95-6844-8CDC-50CBDDC02332}" type="datetimeFigureOut">
               <a:rPr lang="en-US" smtClean="0"/>
-              <a:t>8/5/22</a:t>
+              <a:t>8/5/2022</a:t>
             </a:fld>
             <a:endParaRPr lang="en-US"/>
           </a:p>
@@ -684,7 +684,7 @@
           <a:p>
             <a:fld id="{7DF28905-4B95-6844-8CDC-50CBDDC02332}" type="datetimeFigureOut">
               <a:rPr lang="en-US" smtClean="0"/>
-              <a:t>8/5/22</a:t>
+              <a:t>8/5/2022</a:t>
             </a:fld>
             <a:endParaRPr lang="en-US"/>
           </a:p>
@@ -882,7 +882,7 @@
           <a:p>
             <a:fld id="{7DF28905-4B95-6844-8CDC-50CBDDC02332}" type="datetimeFigureOut">
               <a:rPr lang="en-US" smtClean="0"/>
-              <a:t>8/5/22</a:t>
+              <a:t>8/5/2022</a:t>
             </a:fld>
             <a:endParaRPr lang="en-US"/>
           </a:p>
@@ -1157,7 +1157,7 @@
           <a:p>
             <a:fld id="{7DF28905-4B95-6844-8CDC-50CBDDC02332}" type="datetimeFigureOut">
               <a:rPr lang="en-US" smtClean="0"/>
-              <a:t>8/5/22</a:t>
+              <a:t>8/5/2022</a:t>
             </a:fld>
             <a:endParaRPr lang="en-US"/>
           </a:p>
@@ -1422,7 +1422,7 @@
           <a:p>
             <a:fld id="{7DF28905-4B95-6844-8CDC-50CBDDC02332}" type="datetimeFigureOut">
               <a:rPr lang="en-US" smtClean="0"/>
-              <a:t>8/5/22</a:t>
+              <a:t>8/5/2022</a:t>
             </a:fld>
             <a:endParaRPr lang="en-US"/>
           </a:p>
@@ -1834,7 +1834,7 @@
           <a:p>
             <a:fld id="{7DF28905-4B95-6844-8CDC-50CBDDC02332}" type="datetimeFigureOut">
               <a:rPr lang="en-US" smtClean="0"/>
-              <a:t>8/5/22</a:t>
+              <a:t>8/5/2022</a:t>
             </a:fld>
             <a:endParaRPr lang="en-US"/>
           </a:p>
@@ -1975,7 +1975,7 @@
           <a:p>
             <a:fld id="{7DF28905-4B95-6844-8CDC-50CBDDC02332}" type="datetimeFigureOut">
               <a:rPr lang="en-US" smtClean="0"/>
-              <a:t>8/5/22</a:t>
+              <a:t>8/5/2022</a:t>
             </a:fld>
             <a:endParaRPr lang="en-US"/>
           </a:p>
@@ -2088,7 +2088,7 @@
           <a:p>
             <a:fld id="{7DF28905-4B95-6844-8CDC-50CBDDC02332}" type="datetimeFigureOut">
               <a:rPr lang="en-US" smtClean="0"/>
-              <a:t>8/5/22</a:t>
+              <a:t>8/5/2022</a:t>
             </a:fld>
             <a:endParaRPr lang="en-US"/>
           </a:p>
@@ -2399,7 +2399,7 @@
           <a:p>
             <a:fld id="{7DF28905-4B95-6844-8CDC-50CBDDC02332}" type="datetimeFigureOut">
               <a:rPr lang="en-US" smtClean="0"/>
-              <a:t>8/5/22</a:t>
+              <a:t>8/5/2022</a:t>
             </a:fld>
             <a:endParaRPr lang="en-US"/>
           </a:p>
@@ -2687,7 +2687,7 @@
           <a:p>
             <a:fld id="{7DF28905-4B95-6844-8CDC-50CBDDC02332}" type="datetimeFigureOut">
               <a:rPr lang="en-US" smtClean="0"/>
-              <a:t>8/5/22</a:t>
+              <a:t>8/5/2022</a:t>
             </a:fld>
             <a:endParaRPr lang="en-US"/>
           </a:p>
@@ -2928,7 +2928,7 @@
           <a:p>
             <a:fld id="{7DF28905-4B95-6844-8CDC-50CBDDC02332}" type="datetimeFigureOut">
               <a:rPr lang="en-US" smtClean="0"/>
-              <a:t>8/5/22</a:t>
+              <a:t>8/5/2022</a:t>
             </a:fld>
             <a:endParaRPr lang="en-US"/>
           </a:p>
@@ -4367,7 +4367,7 @@
         </p:blipFill>
         <p:spPr>
           <a:xfrm>
-            <a:off x="2546350" y="3035300"/>
+            <a:off x="1936750" y="2641600"/>
             <a:ext cx="7099300" cy="787400"/>
           </a:xfrm>
           <a:prstGeom prst="rect">

</xml_diff>